<commit_message>
fixes de show list-> display
</commit_message>
<xml_diff>
--- a/Lab03-grupo1-olympics.pptx
+++ b/Lab03-grupo1-olympics.pptx
@@ -128,7 +128,7 @@
   </p:defaultTextStyle>
   <p:extLst>
     <p:ext uri="{EFAFB233-063F-42B5-8137-9DF3F51BA10A}">
-      <p15:sldGuideLst xmlns:p15="http://schemas.microsoft.com/office/powerpoint/2012/main" xmlns="">
+      <p15:sldGuideLst xmlns="" xmlns:p15="http://schemas.microsoft.com/office/powerpoint/2012/main">
         <p15:guide id="1" orient="horz" pos="2160">
           <p15:clr>
             <a:srgbClr val="A4A3A4"/>
@@ -227,7 +227,7 @@
           <a:p>
             <a:fld id="{745C36E7-9E00-462E-80A3-32F2BE615C7A}" type="datetimeFigureOut">
               <a:rPr lang="en-US" smtClean="0"/>
-              <a:t>03-Oct-15</a:t>
+              <a:t>09-Oct-15</a:t>
             </a:fld>
             <a:endParaRPr lang="en-US"/>
           </a:p>
@@ -393,7 +393,7 @@
             <a:fld id="{01F3E309-ED8D-4193-99AF-E5EA90965E98}" type="datetimeFigureOut">
               <a:rPr lang="en-US" smtClean="0"/>
               <a:pPr/>
-              <a:t>03-Oct-15</a:t>
+              <a:t>09-Oct-15</a:t>
             </a:fld>
             <a:endParaRPr lang="en-US"/>
           </a:p>
@@ -2091,7 +2091,7 @@
             <a:fld id="{F3CC9924-33BC-4796-B0F9-D37DB5D899BF}" type="datetimeFigureOut">
               <a:rPr lang="pt-PT" smtClean="0"/>
               <a:pPr/>
-              <a:t>03-10-2015</a:t>
+              <a:t>09-10-2015</a:t>
             </a:fld>
             <a:endParaRPr lang="pt-PT"/>
           </a:p>
@@ -4305,7 +4305,11 @@
             <a:pPr lvl="1"/>
             <a:r>
               <a:rPr lang="en-US" sz="3200" dirty="0" smtClean="0"/>
-              <a:t>“Show a list of the countries with the most gold medalists, in total, in a given year”</a:t>
+              <a:t>“Display the </a:t>
+            </a:r>
+            <a:r>
+              <a:rPr lang="en-US" sz="3200" dirty="0" smtClean="0"/>
+              <a:t>countries with the most gold medalists, in total, in a given year”</a:t>
             </a:r>
           </a:p>
           <a:p>
@@ -4480,7 +4484,15 @@
             </a:r>
             <a:r>
               <a:rPr lang="en-GB" sz="3200" dirty="0"/>
-              <a:t>, show the list of countries with the highest coefficient</a:t>
+              <a:t>, </a:t>
+            </a:r>
+            <a:r>
+              <a:rPr lang="en-GB" sz="3200" smtClean="0"/>
+              <a:t>display the countries </a:t>
+            </a:r>
+            <a:r>
+              <a:rPr lang="en-GB" sz="3200" dirty="0"/>
+              <a:t>with the highest coefficient</a:t>
             </a:r>
             <a:r>
               <a:rPr lang="en-US" sz="3200" dirty="0" smtClean="0"/>
@@ -6757,7 +6769,6 @@
               <a:rPr lang="en-US" dirty="0" smtClean="0"/>
               <a:t>:</a:t>
             </a:r>
-            <a:endParaRPr lang="en-US" dirty="0" smtClean="0"/>
           </a:p>
           <a:p>
             <a:pPr lvl="1"/>

</xml_diff>